<commit_message>
add multimodal video search 1
</commit_message>
<xml_diff>
--- a/搜索推荐广告/广义视频分析/通用视频分析/shucai.pptx
+++ b/搜索推荐广告/广义视频分析/通用视频分析/shucai.pptx
@@ -263,7 +263,7 @@
           <a:p>
             <a:fld id="{629A4BE7-C790-49A3-B002-112BFAE95967}" type="datetimeFigureOut">
               <a:rPr lang="zh-CN" altLang="en-US" smtClean="0"/>
-              <a:t>2021/2/17 Wednesday</a:t>
+              <a:t>2021/6/26 Saturday</a:t>
             </a:fld>
             <a:endParaRPr lang="zh-CN" altLang="en-US"/>
           </a:p>
@@ -461,7 +461,7 @@
           <a:p>
             <a:fld id="{629A4BE7-C790-49A3-B002-112BFAE95967}" type="datetimeFigureOut">
               <a:rPr lang="zh-CN" altLang="en-US" smtClean="0"/>
-              <a:t>2021/2/17 Wednesday</a:t>
+              <a:t>2021/6/26 Saturday</a:t>
             </a:fld>
             <a:endParaRPr lang="zh-CN" altLang="en-US"/>
           </a:p>
@@ -669,7 +669,7 @@
           <a:p>
             <a:fld id="{629A4BE7-C790-49A3-B002-112BFAE95967}" type="datetimeFigureOut">
               <a:rPr lang="zh-CN" altLang="en-US" smtClean="0"/>
-              <a:t>2021/2/17 Wednesday</a:t>
+              <a:t>2021/6/26 Saturday</a:t>
             </a:fld>
             <a:endParaRPr lang="zh-CN" altLang="en-US"/>
           </a:p>
@@ -867,7 +867,7 @@
           <a:p>
             <a:fld id="{629A4BE7-C790-49A3-B002-112BFAE95967}" type="datetimeFigureOut">
               <a:rPr lang="zh-CN" altLang="en-US" smtClean="0"/>
-              <a:t>2021/2/17 Wednesday</a:t>
+              <a:t>2021/6/26 Saturday</a:t>
             </a:fld>
             <a:endParaRPr lang="zh-CN" altLang="en-US"/>
           </a:p>
@@ -1142,7 +1142,7 @@
           <a:p>
             <a:fld id="{629A4BE7-C790-49A3-B002-112BFAE95967}" type="datetimeFigureOut">
               <a:rPr lang="zh-CN" altLang="en-US" smtClean="0"/>
-              <a:t>2021/2/17 Wednesday</a:t>
+              <a:t>2021/6/26 Saturday</a:t>
             </a:fld>
             <a:endParaRPr lang="zh-CN" altLang="en-US"/>
           </a:p>
@@ -1407,7 +1407,7 @@
           <a:p>
             <a:fld id="{629A4BE7-C790-49A3-B002-112BFAE95967}" type="datetimeFigureOut">
               <a:rPr lang="zh-CN" altLang="en-US" smtClean="0"/>
-              <a:t>2021/2/17 Wednesday</a:t>
+              <a:t>2021/6/26 Saturday</a:t>
             </a:fld>
             <a:endParaRPr lang="zh-CN" altLang="en-US"/>
           </a:p>
@@ -1819,7 +1819,7 @@
           <a:p>
             <a:fld id="{629A4BE7-C790-49A3-B002-112BFAE95967}" type="datetimeFigureOut">
               <a:rPr lang="zh-CN" altLang="en-US" smtClean="0"/>
-              <a:t>2021/2/17 Wednesday</a:t>
+              <a:t>2021/6/26 Saturday</a:t>
             </a:fld>
             <a:endParaRPr lang="zh-CN" altLang="en-US"/>
           </a:p>
@@ -1960,7 +1960,7 @@
           <a:p>
             <a:fld id="{629A4BE7-C790-49A3-B002-112BFAE95967}" type="datetimeFigureOut">
               <a:rPr lang="zh-CN" altLang="en-US" smtClean="0"/>
-              <a:t>2021/2/17 Wednesday</a:t>
+              <a:t>2021/6/26 Saturday</a:t>
             </a:fld>
             <a:endParaRPr lang="zh-CN" altLang="en-US"/>
           </a:p>
@@ -2073,7 +2073,7 @@
           <a:p>
             <a:fld id="{629A4BE7-C790-49A3-B002-112BFAE95967}" type="datetimeFigureOut">
               <a:rPr lang="zh-CN" altLang="en-US" smtClean="0"/>
-              <a:t>2021/2/17 Wednesday</a:t>
+              <a:t>2021/6/26 Saturday</a:t>
             </a:fld>
             <a:endParaRPr lang="zh-CN" altLang="en-US"/>
           </a:p>
@@ -2384,7 +2384,7 @@
           <a:p>
             <a:fld id="{629A4BE7-C790-49A3-B002-112BFAE95967}" type="datetimeFigureOut">
               <a:rPr lang="zh-CN" altLang="en-US" smtClean="0"/>
-              <a:t>2021/2/17 Wednesday</a:t>
+              <a:t>2021/6/26 Saturday</a:t>
             </a:fld>
             <a:endParaRPr lang="zh-CN" altLang="en-US"/>
           </a:p>
@@ -2672,7 +2672,7 @@
           <a:p>
             <a:fld id="{629A4BE7-C790-49A3-B002-112BFAE95967}" type="datetimeFigureOut">
               <a:rPr lang="zh-CN" altLang="en-US" smtClean="0"/>
-              <a:t>2021/2/17 Wednesday</a:t>
+              <a:t>2021/6/26 Saturday</a:t>
             </a:fld>
             <a:endParaRPr lang="zh-CN" altLang="en-US"/>
           </a:p>
@@ -2913,7 +2913,7 @@
           <a:p>
             <a:fld id="{629A4BE7-C790-49A3-B002-112BFAE95967}" type="datetimeFigureOut">
               <a:rPr lang="zh-CN" altLang="en-US" smtClean="0"/>
-              <a:t>2021/2/17 Wednesday</a:t>
+              <a:t>2021/6/26 Saturday</a:t>
             </a:fld>
             <a:endParaRPr lang="zh-CN" altLang="en-US"/>
           </a:p>
@@ -3753,6 +3753,323 @@
           <a:chExt cx="0" cy="0"/>
         </a:xfrm>
       </p:grpSpPr>
+      <p:grpSp>
+        <p:nvGrpSpPr>
+          <p:cNvPr id="14" name="组合 13">
+            <a:extLst>
+              <a:ext uri="{FF2B5EF4-FFF2-40B4-BE49-F238E27FC236}">
+                <a16:creationId xmlns:a16="http://schemas.microsoft.com/office/drawing/2014/main" id="{251B5611-1DDC-487B-B45E-03E9D74A8507}"/>
+              </a:ext>
+            </a:extLst>
+          </p:cNvPr>
+          <p:cNvGrpSpPr/>
+          <p:nvPr/>
+        </p:nvGrpSpPr>
+        <p:grpSpPr>
+          <a:xfrm>
+            <a:off x="3103418" y="557212"/>
+            <a:ext cx="5486400" cy="5743575"/>
+            <a:chOff x="3103418" y="557212"/>
+            <a:chExt cx="5486400" cy="5743575"/>
+          </a:xfrm>
+        </p:grpSpPr>
+        <p:pic>
+          <p:nvPicPr>
+            <p:cNvPr id="3" name="图片 2">
+              <a:extLst>
+                <a:ext uri="{FF2B5EF4-FFF2-40B4-BE49-F238E27FC236}">
+                  <a16:creationId xmlns:a16="http://schemas.microsoft.com/office/drawing/2014/main" id="{B779872C-804B-4A75-8502-1F6E66EE23B2}"/>
+                </a:ext>
+              </a:extLst>
+            </p:cNvPr>
+            <p:cNvPicPr>
+              <a:picLocks noChangeAspect="1"/>
+            </p:cNvPicPr>
+            <p:nvPr/>
+          </p:nvPicPr>
+          <p:blipFill>
+            <a:blip r:embed="rId2">
+              <a:extLst>
+                <a:ext uri="{28A0092B-C50C-407E-A947-70E740481C1C}">
+                  <a14:useLocalDpi xmlns:a14="http://schemas.microsoft.com/office/drawing/2010/main" val="0"/>
+                </a:ext>
+              </a:extLst>
+            </a:blip>
+            <a:stretch>
+              <a:fillRect/>
+            </a:stretch>
+          </p:blipFill>
+          <p:spPr>
+            <a:xfrm>
+              <a:off x="3103418" y="557212"/>
+              <a:ext cx="5486400" cy="5743575"/>
+            </a:xfrm>
+            <a:prstGeom prst="rect">
+              <a:avLst/>
+            </a:prstGeom>
+          </p:spPr>
+        </p:pic>
+        <p:sp>
+          <p:nvSpPr>
+            <p:cNvPr id="4" name="矩形 3">
+              <a:extLst>
+                <a:ext uri="{FF2B5EF4-FFF2-40B4-BE49-F238E27FC236}">
+                  <a16:creationId xmlns:a16="http://schemas.microsoft.com/office/drawing/2014/main" id="{64791E2E-A43F-4315-85EE-3D21E9ECE8F7}"/>
+                </a:ext>
+              </a:extLst>
+            </p:cNvPr>
+            <p:cNvSpPr/>
+            <p:nvPr/>
+          </p:nvSpPr>
+          <p:spPr>
+            <a:xfrm>
+              <a:off x="3852863" y="1333500"/>
+              <a:ext cx="904875" cy="1295400"/>
+            </a:xfrm>
+            <a:prstGeom prst="rect">
+              <a:avLst/>
+            </a:prstGeom>
+            <a:noFill/>
+            <a:ln>
+              <a:prstDash val="dash"/>
+            </a:ln>
+          </p:spPr>
+          <p:style>
+            <a:lnRef idx="2">
+              <a:schemeClr val="accent1">
+                <a:shade val="50000"/>
+              </a:schemeClr>
+            </a:lnRef>
+            <a:fillRef idx="1">
+              <a:schemeClr val="accent1"/>
+            </a:fillRef>
+            <a:effectRef idx="0">
+              <a:schemeClr val="accent1"/>
+            </a:effectRef>
+            <a:fontRef idx="minor">
+              <a:schemeClr val="lt1"/>
+            </a:fontRef>
+          </p:style>
+          <p:txBody>
+            <a:bodyPr rtlCol="0" anchor="ctr"/>
+            <a:lstStyle/>
+            <a:p>
+              <a:pPr algn="ctr"/>
+              <a:endParaRPr lang="zh-CN" altLang="en-US"/>
+            </a:p>
+          </p:txBody>
+        </p:sp>
+        <p:sp>
+          <p:nvSpPr>
+            <p:cNvPr id="5" name="矩形 4">
+              <a:extLst>
+                <a:ext uri="{FF2B5EF4-FFF2-40B4-BE49-F238E27FC236}">
+                  <a16:creationId xmlns:a16="http://schemas.microsoft.com/office/drawing/2014/main" id="{E9EFEC9A-0AB3-4FCC-9649-EC357A99AC21}"/>
+                </a:ext>
+              </a:extLst>
+            </p:cNvPr>
+            <p:cNvSpPr/>
+            <p:nvPr/>
+          </p:nvSpPr>
+          <p:spPr>
+            <a:xfrm>
+              <a:off x="4824413" y="1547812"/>
+              <a:ext cx="809625" cy="1081088"/>
+            </a:xfrm>
+            <a:prstGeom prst="rect">
+              <a:avLst/>
+            </a:prstGeom>
+            <a:noFill/>
+            <a:ln>
+              <a:prstDash val="dash"/>
+            </a:ln>
+          </p:spPr>
+          <p:style>
+            <a:lnRef idx="2">
+              <a:schemeClr val="accent1">
+                <a:shade val="50000"/>
+              </a:schemeClr>
+            </a:lnRef>
+            <a:fillRef idx="1">
+              <a:schemeClr val="accent1"/>
+            </a:fillRef>
+            <a:effectRef idx="0">
+              <a:schemeClr val="accent1"/>
+            </a:effectRef>
+            <a:fontRef idx="minor">
+              <a:schemeClr val="lt1"/>
+            </a:fontRef>
+          </p:style>
+          <p:txBody>
+            <a:bodyPr rtlCol="0" anchor="ctr"/>
+            <a:lstStyle/>
+            <a:p>
+              <a:pPr algn="ctr"/>
+              <a:endParaRPr lang="zh-CN" altLang="en-US"/>
+            </a:p>
+          </p:txBody>
+        </p:sp>
+        <p:sp>
+          <p:nvSpPr>
+            <p:cNvPr id="7" name="矩形 6">
+              <a:extLst>
+                <a:ext uri="{FF2B5EF4-FFF2-40B4-BE49-F238E27FC236}">
+                  <a16:creationId xmlns:a16="http://schemas.microsoft.com/office/drawing/2014/main" id="{EADB1A92-16DF-40A1-B55C-344828FDB77E}"/>
+                </a:ext>
+              </a:extLst>
+            </p:cNvPr>
+            <p:cNvSpPr/>
+            <p:nvPr/>
+          </p:nvSpPr>
+          <p:spPr>
+            <a:xfrm>
+              <a:off x="3103418" y="557212"/>
+              <a:ext cx="2587770" cy="1119188"/>
+            </a:xfrm>
+            <a:prstGeom prst="rect">
+              <a:avLst/>
+            </a:prstGeom>
+            <a:noFill/>
+            <a:ln>
+              <a:solidFill>
+                <a:schemeClr val="accent6">
+                  <a:lumMod val="50000"/>
+                </a:schemeClr>
+              </a:solidFill>
+              <a:prstDash val="dash"/>
+            </a:ln>
+          </p:spPr>
+          <p:style>
+            <a:lnRef idx="2">
+              <a:schemeClr val="accent1">
+                <a:shade val="50000"/>
+              </a:schemeClr>
+            </a:lnRef>
+            <a:fillRef idx="1">
+              <a:schemeClr val="accent1"/>
+            </a:fillRef>
+            <a:effectRef idx="0">
+              <a:schemeClr val="accent1"/>
+            </a:effectRef>
+            <a:fontRef idx="minor">
+              <a:schemeClr val="lt1"/>
+            </a:fontRef>
+          </p:style>
+          <p:txBody>
+            <a:bodyPr rtlCol="0" anchor="ctr"/>
+            <a:lstStyle/>
+            <a:p>
+              <a:pPr algn="ctr"/>
+              <a:endParaRPr lang="zh-CN" altLang="en-US"/>
+            </a:p>
+          </p:txBody>
+        </p:sp>
+        <p:sp>
+          <p:nvSpPr>
+            <p:cNvPr id="10" name="椭圆 9">
+              <a:extLst>
+                <a:ext uri="{FF2B5EF4-FFF2-40B4-BE49-F238E27FC236}">
+                  <a16:creationId xmlns:a16="http://schemas.microsoft.com/office/drawing/2014/main" id="{91EC15E3-2046-403C-B702-45DC2F5376AD}"/>
+                </a:ext>
+              </a:extLst>
+            </p:cNvPr>
+            <p:cNvSpPr/>
+            <p:nvPr/>
+          </p:nvSpPr>
+          <p:spPr>
+            <a:xfrm>
+              <a:off x="3386137" y="2919412"/>
+              <a:ext cx="433388" cy="295275"/>
+            </a:xfrm>
+            <a:prstGeom prst="ellipse">
+              <a:avLst/>
+            </a:prstGeom>
+            <a:noFill/>
+            <a:ln>
+              <a:prstDash val="dash"/>
+            </a:ln>
+          </p:spPr>
+          <p:style>
+            <a:lnRef idx="2">
+              <a:schemeClr val="accent1">
+                <a:shade val="50000"/>
+              </a:schemeClr>
+            </a:lnRef>
+            <a:fillRef idx="1">
+              <a:schemeClr val="accent1"/>
+            </a:fillRef>
+            <a:effectRef idx="0">
+              <a:schemeClr val="accent1"/>
+            </a:effectRef>
+            <a:fontRef idx="minor">
+              <a:schemeClr val="lt1"/>
+            </a:fontRef>
+          </p:style>
+          <p:txBody>
+            <a:bodyPr rtlCol="0" anchor="ctr"/>
+            <a:lstStyle/>
+            <a:p>
+              <a:pPr algn="ctr"/>
+              <a:endParaRPr lang="zh-CN" altLang="en-US"/>
+            </a:p>
+          </p:txBody>
+        </p:sp>
+        <p:sp>
+          <p:nvSpPr>
+            <p:cNvPr id="11" name="椭圆 10">
+              <a:extLst>
+                <a:ext uri="{FF2B5EF4-FFF2-40B4-BE49-F238E27FC236}">
+                  <a16:creationId xmlns:a16="http://schemas.microsoft.com/office/drawing/2014/main" id="{42A7BA3B-F4D8-431F-9EE7-8B3034BA69C6}"/>
+                </a:ext>
+              </a:extLst>
+            </p:cNvPr>
+            <p:cNvSpPr/>
+            <p:nvPr/>
+          </p:nvSpPr>
+          <p:spPr>
+            <a:xfrm>
+              <a:off x="4102244" y="2897981"/>
+              <a:ext cx="1273969" cy="338136"/>
+            </a:xfrm>
+            <a:prstGeom prst="ellipse">
+              <a:avLst/>
+            </a:prstGeom>
+            <a:noFill/>
+            <a:ln>
+              <a:solidFill>
+                <a:schemeClr val="accent6">
+                  <a:lumMod val="50000"/>
+                </a:schemeClr>
+              </a:solidFill>
+              <a:prstDash val="dash"/>
+            </a:ln>
+          </p:spPr>
+          <p:style>
+            <a:lnRef idx="2">
+              <a:schemeClr val="accent1">
+                <a:shade val="50000"/>
+              </a:schemeClr>
+            </a:lnRef>
+            <a:fillRef idx="1">
+              <a:schemeClr val="accent1"/>
+            </a:fillRef>
+            <a:effectRef idx="0">
+              <a:schemeClr val="accent1"/>
+            </a:effectRef>
+            <a:fontRef idx="minor">
+              <a:schemeClr val="lt1"/>
+            </a:fontRef>
+          </p:style>
+          <p:txBody>
+            <a:bodyPr rtlCol="0" anchor="ctr"/>
+            <a:lstStyle/>
+            <a:p>
+              <a:pPr algn="ctr"/>
+              <a:endParaRPr lang="zh-CN" altLang="en-US"/>
+            </a:p>
+          </p:txBody>
+        </p:sp>
+      </p:grpSp>
     </p:spTree>
     <p:extLst>
       <p:ext uri="{BB962C8B-B14F-4D97-AF65-F5344CB8AC3E}">

</xml_diff>